<commit_message>
Refactor 002: Add new and missing files
</commit_message>
<xml_diff>
--- a/src/site/resources/ppt/PropertyDigester.pptx
+++ b/src/site/resources/ppt/PropertyDigester.pptx
@@ -194,7 +194,7 @@
           <a:p>
             <a:fld id="{5AA4C20A-02F9-4A20-A581-868720A843DD}" type="datetimeFigureOut">
               <a:rPr lang="en-GB" smtClean="0"/>
-              <a:t>27/10/2014</a:t>
+              <a:t>26/02/17</a:t>
             </a:fld>
             <a:endParaRPr lang="en-GB" dirty="0"/>
           </a:p>
@@ -362,6 +362,11 @@
         </p:txBody>
       </p:sp>
     </p:spTree>
+    <p:extLst>
+      <p:ext uri="{BB962C8B-B14F-4D97-AF65-F5344CB8AC3E}">
+        <p14:creationId xmlns:p14="http://schemas.microsoft.com/office/powerpoint/2010/main" val="3825046286"/>
+      </p:ext>
+    </p:extLst>
   </p:cSld>
   <p:clrMap bg1="lt1" tx1="dk1" bg2="lt2" tx2="dk2" accent1="accent1" accent2="accent2" accent3="accent3" accent4="accent4" accent5="accent5" accent6="accent6" hlink="hlink" folHlink="folHlink"/>
   <p:notesStyle>
@@ -883,7 +888,7 @@
           <a:p>
             <a:fld id="{CB929518-1CE0-4497-A850-DFFBF84E96F6}" type="datetimeFigureOut">
               <a:rPr lang="en-GB" smtClean="0"/>
-              <a:t>27/10/2014</a:t>
+              <a:t>26/02/17</a:t>
             </a:fld>
             <a:endParaRPr lang="en-GB" dirty="0"/>
           </a:p>
@@ -1048,7 +1053,7 @@
           <a:p>
             <a:fld id="{CB929518-1CE0-4497-A850-DFFBF84E96F6}" type="datetimeFigureOut">
               <a:rPr lang="en-GB" smtClean="0"/>
-              <a:t>27/10/2014</a:t>
+              <a:t>26/02/17</a:t>
             </a:fld>
             <a:endParaRPr lang="en-GB" dirty="0"/>
           </a:p>
@@ -1223,7 +1228,7 @@
           <a:p>
             <a:fld id="{CB929518-1CE0-4497-A850-DFFBF84E96F6}" type="datetimeFigureOut">
               <a:rPr lang="en-GB" smtClean="0"/>
-              <a:t>27/10/2014</a:t>
+              <a:t>26/02/17</a:t>
             </a:fld>
             <a:endParaRPr lang="en-GB" dirty="0"/>
           </a:p>
@@ -1388,7 +1393,7 @@
           <a:p>
             <a:fld id="{CB929518-1CE0-4497-A850-DFFBF84E96F6}" type="datetimeFigureOut">
               <a:rPr lang="en-GB" smtClean="0"/>
-              <a:t>27/10/2014</a:t>
+              <a:t>26/02/17</a:t>
             </a:fld>
             <a:endParaRPr lang="en-GB" dirty="0"/>
           </a:p>
@@ -1629,7 +1634,7 @@
           <a:p>
             <a:fld id="{CB929518-1CE0-4497-A850-DFFBF84E96F6}" type="datetimeFigureOut">
               <a:rPr lang="en-GB" smtClean="0"/>
-              <a:t>27/10/2014</a:t>
+              <a:t>26/02/17</a:t>
             </a:fld>
             <a:endParaRPr lang="en-GB" dirty="0"/>
           </a:p>
@@ -1912,7 +1917,7 @@
           <a:p>
             <a:fld id="{CB929518-1CE0-4497-A850-DFFBF84E96F6}" type="datetimeFigureOut">
               <a:rPr lang="en-GB" smtClean="0"/>
-              <a:t>27/10/2014</a:t>
+              <a:t>26/02/17</a:t>
             </a:fld>
             <a:endParaRPr lang="en-GB" dirty="0"/>
           </a:p>
@@ -2329,7 +2334,7 @@
           <a:p>
             <a:fld id="{CB929518-1CE0-4497-A850-DFFBF84E96F6}" type="datetimeFigureOut">
               <a:rPr lang="en-GB" smtClean="0"/>
-              <a:t>27/10/2014</a:t>
+              <a:t>26/02/17</a:t>
             </a:fld>
             <a:endParaRPr lang="en-GB" dirty="0"/>
           </a:p>
@@ -2442,7 +2447,7 @@
           <a:p>
             <a:fld id="{CB929518-1CE0-4497-A850-DFFBF84E96F6}" type="datetimeFigureOut">
               <a:rPr lang="en-GB" smtClean="0"/>
-              <a:t>27/10/2014</a:t>
+              <a:t>26/02/17</a:t>
             </a:fld>
             <a:endParaRPr lang="en-GB" dirty="0"/>
           </a:p>
@@ -2532,7 +2537,7 @@
           <a:p>
             <a:fld id="{CB929518-1CE0-4497-A850-DFFBF84E96F6}" type="datetimeFigureOut">
               <a:rPr lang="en-GB" smtClean="0"/>
-              <a:t>27/10/2014</a:t>
+              <a:t>26/02/17</a:t>
             </a:fld>
             <a:endParaRPr lang="en-GB" dirty="0"/>
           </a:p>
@@ -2804,7 +2809,7 @@
           <a:p>
             <a:fld id="{CB929518-1CE0-4497-A850-DFFBF84E96F6}" type="datetimeFigureOut">
               <a:rPr lang="en-GB" smtClean="0"/>
-              <a:t>27/10/2014</a:t>
+              <a:t>26/02/17</a:t>
             </a:fld>
             <a:endParaRPr lang="en-GB" dirty="0"/>
           </a:p>
@@ -3052,7 +3057,7 @@
           <a:p>
             <a:fld id="{CB929518-1CE0-4497-A850-DFFBF84E96F6}" type="datetimeFigureOut">
               <a:rPr lang="en-GB" smtClean="0"/>
-              <a:t>27/10/2014</a:t>
+              <a:t>26/02/17</a:t>
             </a:fld>
             <a:endParaRPr lang="en-GB" dirty="0"/>
           </a:p>
@@ -3260,7 +3265,7 @@
           <a:p>
             <a:fld id="{CB929518-1CE0-4497-A850-DFFBF84E96F6}" type="datetimeFigureOut">
               <a:rPr lang="en-GB" smtClean="0"/>
-              <a:t>27/10/2014</a:t>
+              <a:t>26/02/17</a:t>
             </a:fld>
             <a:endParaRPr lang="en-GB" dirty="0"/>
           </a:p>
@@ -4567,7 +4572,15 @@
                   <a:schemeClr val="tx1"/>
                 </a:solidFill>
               </a:rPr>
-              <a:t>PROPERTY_SOURCE= PropertyDecoderService</a:t>
+              <a:t>PROPERTY_SOURCE= </a:t>
+            </a:r>
+            <a:r>
+              <a:rPr lang="en-GB" sz="800" dirty="0" err="1" smtClean="0">
+                <a:solidFill>
+                  <a:schemeClr val="tx1"/>
+                </a:solidFill>
+              </a:rPr>
+              <a:t>PropertyCodecService</a:t>
             </a:r>
             <a:endParaRPr lang="en-GB" sz="800" dirty="0" smtClean="0">
               <a:solidFill>
@@ -5859,14 +5872,6 @@
                 </a:rPr>
                 <a:t>PROPERTY_SOURCE= PropertyDecoderService</a:t>
               </a:r>
-              <a:endParaRPr lang="en-GB" sz="200" dirty="0" smtClean="0">
-                <a:solidFill>
-                  <a:schemeClr val="tx1"/>
-                </a:solidFill>
-                <a:latin typeface="Verdana" pitchFamily="34" charset="0"/>
-                <a:ea typeface="Verdana" pitchFamily="34" charset="0"/>
-                <a:cs typeface="Verdana" pitchFamily="34" charset="0"/>
-              </a:endParaRPr>
             </a:p>
             <a:p>
               <a:pPr algn="ctr"/>
@@ -6120,7 +6125,7 @@
         <p:spPr>
           <a:xfrm>
             <a:off x="3275856" y="908720"/>
-            <a:ext cx="2201244" cy="261610"/>
+            <a:ext cx="2024769" cy="261610"/>
           </a:xfrm>
           <a:prstGeom prst="rect">
             <a:avLst/>
@@ -6142,7 +6147,7 @@
                 <a:ea typeface="Verdana" pitchFamily="34" charset="0"/>
                 <a:cs typeface="Verdana" pitchFamily="34" charset="0"/>
               </a:rPr>
-              <a:t>Property Decoder Service</a:t>
+              <a:t>Property Codec Service</a:t>
             </a:r>
             <a:endParaRPr lang="en-GB" sz="1100" b="1" dirty="0">
               <a:solidFill>
@@ -6611,7 +6616,7 @@
             <a:pPr algn="ctr"/>
             <a:r>
               <a:rPr lang="en-GB" sz="1000" b="1" dirty="0" smtClean="0"/>
-              <a:t>Decoders</a:t>
+              <a:t>Codecs</a:t>
             </a:r>
             <a:endParaRPr lang="en-GB" sz="1000" b="1" dirty="0"/>
           </a:p>
@@ -7382,7 +7387,7 @@
         <p:spPr>
           <a:xfrm>
             <a:off x="2933918" y="3933056"/>
-            <a:ext cx="1410964" cy="246221"/>
+            <a:ext cx="1251289" cy="246221"/>
           </a:xfrm>
           <a:prstGeom prst="rect">
             <a:avLst/>
@@ -7404,7 +7409,7 @@
                 <a:ea typeface="Verdana" pitchFamily="34" charset="0"/>
                 <a:cs typeface="Verdana" pitchFamily="34" charset="0"/>
               </a:rPr>
-              <a:t>Decoder Plug-ins</a:t>
+              <a:t>Codec Plug-ins</a:t>
             </a:r>
             <a:endParaRPr lang="en-GB" sz="1000" b="1" dirty="0">
               <a:solidFill>
@@ -8076,8 +8081,8 @@
           <a:p>
             <a:pPr algn="ctr"/>
             <a:r>
-              <a:rPr lang="en-GB" sz="1000" b="1" dirty="0" smtClean="0"/>
-              <a:t>decoder.properties</a:t>
+              <a:rPr lang="en-GB" sz="1000" b="1" dirty="0" err="1" smtClean="0"/>
+              <a:t>codec.properties</a:t>
             </a:r>
             <a:endParaRPr lang="en-GB" sz="1000" b="1" dirty="0"/>
           </a:p>
@@ -8164,7 +8169,7 @@
                   <a:schemeClr val="tx1"/>
                 </a:solidFill>
               </a:rPr>
-              <a:t>#Property Decoders</a:t>
+              <a:t># Property Codecs</a:t>
             </a:r>
           </a:p>
         </p:txBody>
@@ -8470,11 +8475,6 @@
               </a:rPr>
               <a:t># Property Set Three</a:t>
             </a:r>
-            <a:endParaRPr lang="en-GB" sz="800" dirty="0" smtClean="0">
-              <a:solidFill>
-                <a:schemeClr val="tx1"/>
-              </a:solidFill>
-            </a:endParaRPr>
           </a:p>
         </p:txBody>
       </p:sp>
@@ -8604,11 +8604,6 @@
               </a:rPr>
               <a:t># Property Set Two</a:t>
             </a:r>
-            <a:endParaRPr lang="en-GB" sz="800" dirty="0" smtClean="0">
-              <a:solidFill>
-                <a:schemeClr val="tx1"/>
-              </a:solidFill>
-            </a:endParaRPr>
           </a:p>
         </p:txBody>
       </p:sp>
@@ -8738,11 +8733,6 @@
               </a:rPr>
               <a:t># Property Set One</a:t>
             </a:r>
-            <a:endParaRPr lang="en-GB" sz="800" dirty="0" smtClean="0">
-              <a:solidFill>
-                <a:schemeClr val="tx1"/>
-              </a:solidFill>
-            </a:endParaRPr>
           </a:p>
         </p:txBody>
       </p:sp>
@@ -10507,14 +10497,6 @@
                 </a:rPr>
                 <a:t>PROPERTY_SOURCE= PropertyDecoderService</a:t>
               </a:r>
-              <a:endParaRPr lang="en-GB" sz="200" dirty="0" smtClean="0">
-                <a:solidFill>
-                  <a:schemeClr val="tx1"/>
-                </a:solidFill>
-                <a:latin typeface="Verdana" pitchFamily="34" charset="0"/>
-                <a:ea typeface="Verdana" pitchFamily="34" charset="0"/>
-                <a:cs typeface="Verdana" pitchFamily="34" charset="0"/>
-              </a:endParaRPr>
             </a:p>
             <a:p>
               <a:pPr algn="ctr"/>

</xml_diff>